<commit_message>
Simi complete backend, finalized fontend
</commit_message>
<xml_diff>
--- a/_Docs/Poll_it_wireframe.pptx
+++ b/_Docs/Poll_it_wireframe.pptx
@@ -12,7 +12,6 @@
     <p:sldId id="259" r:id="rId7"/>
     <p:sldId id="260" r:id="rId8"/>
     <p:sldId id="261" r:id="rId9"/>
-    <p:sldId id="262" r:id="rId10"/>
   </p:sldIdLst>
   <p:sldSz cx="10080625" cy="7559675"/>
   <p:notesSz cx="7772400" cy="10058400"/>
@@ -5812,8 +5811,8 @@
         </p:nvSpPr>
         <p:spPr>
           <a:xfrm>
-            <a:off x="4006440" y="3975840"/>
-            <a:ext cx="2011320" cy="1554120"/>
+            <a:off x="4070160" y="4186440"/>
+            <a:ext cx="1645920" cy="1371600"/>
           </a:xfrm>
           <a:prstGeom prst="rect">
             <a:avLst/>
@@ -5878,8 +5877,8 @@
         </p:nvSpPr>
         <p:spPr>
           <a:xfrm>
-            <a:off x="2194560" y="1645920"/>
-            <a:ext cx="2011320" cy="1554120"/>
+            <a:off x="3978360" y="1645920"/>
+            <a:ext cx="1737720" cy="1280160"/>
           </a:xfrm>
           <a:prstGeom prst="rect">
             <a:avLst/>
@@ -5944,8 +5943,8 @@
         </p:nvSpPr>
         <p:spPr>
           <a:xfrm>
-            <a:off x="5943600" y="1645920"/>
-            <a:ext cx="2011320" cy="1554120"/>
+            <a:off x="7040880" y="1645920"/>
+            <a:ext cx="1554480" cy="1280160"/>
           </a:xfrm>
           <a:prstGeom prst="rect">
             <a:avLst/>
@@ -6009,70 +6008,8 @@
           <p:nvPr/>
         </p:nvSpPr>
         <p:spPr>
-          <a:xfrm flipV="1">
-            <a:off x="6018120" y="3199680"/>
-            <a:ext cx="931320" cy="1552680"/>
-          </a:xfrm>
-          <a:prstGeom prst="bentConnector3">
-            <a:avLst>
-              <a:gd name="adj1" fmla="val 50000"/>
-            </a:avLst>
-          </a:prstGeom>
-          <a:noFill/>
-          <a:ln>
-            <a:solidFill>
-              <a:srgbClr val="000000"/>
-            </a:solidFill>
-            <a:tailEnd len="med" type="triangle" w="med"/>
-          </a:ln>
-        </p:spPr>
-        <p:style>
-          <a:lnRef idx="0"/>
-          <a:fillRef idx="0"/>
-          <a:effectRef idx="0"/>
-          <a:fontRef idx="minor"/>
-        </p:style>
-      </p:sp>
-      <p:sp>
-        <p:nvSpPr>
-          <p:cNvPr id="99" name="CustomShape 6"/>
-          <p:cNvSpPr/>
-          <p:nvPr/>
-        </p:nvSpPr>
-        <p:spPr>
-          <a:xfrm>
-            <a:off x="4206240" y="2423160"/>
-            <a:ext cx="1737360" cy="360"/>
-          </a:xfrm>
-          <a:prstGeom prst="bentConnector3">
-            <a:avLst>
-              <a:gd name="adj1" fmla="val 50000"/>
-            </a:avLst>
-          </a:prstGeom>
-          <a:noFill/>
-          <a:ln>
-            <a:solidFill>
-              <a:srgbClr val="000000"/>
-            </a:solidFill>
-            <a:tailEnd len="med" type="triangle" w="med"/>
-          </a:ln>
-        </p:spPr>
-        <p:style>
-          <a:lnRef idx="0"/>
-          <a:fillRef idx="0"/>
-          <a:effectRef idx="0"/>
-          <a:fontRef idx="minor"/>
-        </p:style>
-      </p:sp>
-      <p:sp>
-        <p:nvSpPr>
-          <p:cNvPr id="100" name="CustomShape 7"/>
-          <p:cNvSpPr/>
-          <p:nvPr/>
-        </p:nvSpPr>
-        <p:spPr>
-          <a:xfrm>
-            <a:off x="6309360" y="5140080"/>
+          <a:xfrm>
+            <a:off x="4618800" y="3840480"/>
             <a:ext cx="273960" cy="345960"/>
           </a:xfrm>
           <a:prstGeom prst="rect">
@@ -6122,13 +6059,13 @@
       </p:sp>
       <p:sp>
         <p:nvSpPr>
-          <p:cNvPr id="101" name="CustomShape 8"/>
+          <p:cNvPr id="99" name="CustomShape 6"/>
           <p:cNvSpPr/>
           <p:nvPr/>
         </p:nvSpPr>
         <p:spPr>
           <a:xfrm>
-            <a:off x="7040880" y="3291840"/>
+            <a:off x="4618800" y="2945880"/>
             <a:ext cx="273960" cy="345960"/>
           </a:xfrm>
           <a:prstGeom prst="rect">
@@ -6178,13 +6115,13 @@
       </p:sp>
       <p:sp>
         <p:nvSpPr>
-          <p:cNvPr id="102" name="CustomShape 9"/>
+          <p:cNvPr id="100" name="CustomShape 7"/>
           <p:cNvSpPr/>
           <p:nvPr/>
         </p:nvSpPr>
         <p:spPr>
           <a:xfrm>
-            <a:off x="4297680" y="2103120"/>
+            <a:off x="5716080" y="1985760"/>
             <a:ext cx="273960" cy="345960"/>
           </a:xfrm>
           <a:prstGeom prst="rect">
@@ -6234,14 +6171,14 @@
       </p:sp>
       <p:sp>
         <p:nvSpPr>
-          <p:cNvPr id="103" name="CustomShape 10"/>
+          <p:cNvPr id="101" name="CustomShape 8"/>
           <p:cNvSpPr/>
           <p:nvPr/>
         </p:nvSpPr>
         <p:spPr>
           <a:xfrm>
-            <a:off x="5577840" y="2076840"/>
-            <a:ext cx="273960" cy="345960"/>
+            <a:off x="6813000" y="1986120"/>
+            <a:ext cx="273960" cy="345600"/>
           </a:xfrm>
           <a:prstGeom prst="rect">
             <a:avLst/>
@@ -6288,691 +6225,16 @@
           </a:p>
         </p:txBody>
       </p:sp>
-    </p:spTree>
-  </p:cSld>
-  <p:timing>
-    <p:tnLst>
-      <p:par>
-        <p:cTn id="11" dur="indefinite" restart="never" nodeType="tmRoot">
-          <p:childTnLst>
-            <p:seq>
-              <p:cTn id="12" nodeType="mainSeq"/>
-              <p:prevCondLst>
-                <p:cond delay="0" evt="onPrev">
-                  <p:tgtEl>
-                    <p:sldTgt/>
-                  </p:tgtEl>
-                </p:cond>
-              </p:prevCondLst>
-              <p:nextCondLst>
-                <p:cond delay="0" evt="onNext">
-                  <p:tgtEl>
-                    <p:sldTgt/>
-                  </p:tgtEl>
-                </p:cond>
-              </p:nextCondLst>
-            </p:seq>
-          </p:childTnLst>
-        </p:cTn>
-      </p:par>
-    </p:tnLst>
-  </p:timing>
-</p:sld>
-</file>
-
-<file path=ppt/slides/slide7.xml><?xml version="1.0" encoding="utf-8"?>
-<p:sld xmlns:a="http://schemas.openxmlformats.org/drawingml/2006/main" xmlns:p="http://schemas.openxmlformats.org/presentationml/2006/main" xmlns:r="http://schemas.openxmlformats.org/officeDocument/2006/relationships">
-  <p:cSld>
-    <p:spTree>
-      <p:nvGrpSpPr>
-        <p:cNvPr id="1" name=""/>
-        <p:cNvGrpSpPr/>
-        <p:nvPr/>
-      </p:nvGrpSpPr>
-      <p:grpSpPr>
-        <a:xfrm>
-          <a:off x="0" y="0"/>
-          <a:ext cx="0" cy="0"/>
-          <a:chOff x="0" y="0"/>
-          <a:chExt cx="0" cy="0"/>
-        </a:xfrm>
-      </p:grpSpPr>
-      <p:sp>
-        <p:nvSpPr>
-          <p:cNvPr id="104" name="CustomShape 1"/>
+      <p:sp>
+        <p:nvSpPr>
+          <p:cNvPr id="102" name="CustomShape 9"/>
           <p:cNvSpPr/>
           <p:nvPr/>
         </p:nvSpPr>
         <p:spPr>
           <a:xfrm>
-            <a:off x="504000" y="294480"/>
-            <a:ext cx="9071280" cy="626400"/>
-          </a:xfrm>
-          <a:prstGeom prst="rect">
-            <a:avLst/>
-          </a:prstGeom>
-          <a:noFill/>
-          <a:ln>
-            <a:noFill/>
-          </a:ln>
-        </p:spPr>
-        <p:style>
-          <a:lnRef idx="0"/>
-          <a:fillRef idx="0"/>
-          <a:effectRef idx="0"/>
-          <a:fontRef idx="minor"/>
-        </p:style>
-        <p:txBody>
-          <a:bodyPr lIns="0" rIns="0" tIns="0" bIns="0" anchor="ctr"/>
-          <a:p>
-            <a:pPr algn="ctr">
-              <a:lnSpc>
-                <a:spcPct val="100000"/>
-              </a:lnSpc>
-            </a:pPr>
-            <a:r>
-              <a:rPr lang="en-US" sz="4400" spc="-1" strike="noStrike">
-                <a:solidFill>
-                  <a:srgbClr val="000000"/>
-                </a:solidFill>
-                <a:uFill>
-                  <a:solidFill>
-                    <a:srgbClr val="ffffff"/>
-                  </a:solidFill>
-                </a:uFill>
-                <a:latin typeface="Arial"/>
-              </a:rPr>
-              <a:t>ERDv2</a:t>
-            </a:r>
-            <a:endParaRPr lang="en-US" sz="1800" spc="-1" strike="noStrike">
-              <a:solidFill>
-                <a:srgbClr val="000000"/>
-              </a:solidFill>
-              <a:uFill>
-                <a:solidFill>
-                  <a:srgbClr val="ffffff"/>
-                </a:solidFill>
-              </a:uFill>
-              <a:latin typeface="Arial"/>
-            </a:endParaRPr>
-          </a:p>
-        </p:txBody>
-      </p:sp>
-      <p:sp>
-        <p:nvSpPr>
-          <p:cNvPr id="105" name="CustomShape 2"/>
-          <p:cNvSpPr/>
-          <p:nvPr/>
-        </p:nvSpPr>
-        <p:spPr>
-          <a:xfrm>
-            <a:off x="4023360" y="4206240"/>
-            <a:ext cx="2011320" cy="1554120"/>
-          </a:xfrm>
-          <a:prstGeom prst="rect">
-            <a:avLst/>
-          </a:prstGeom>
-          <a:solidFill>
-            <a:srgbClr val="729fcf"/>
-          </a:solidFill>
-          <a:ln>
-            <a:solidFill>
-              <a:srgbClr val="3465a4"/>
-            </a:solidFill>
-          </a:ln>
-        </p:spPr>
-        <p:style>
-          <a:lnRef idx="0"/>
-          <a:fillRef idx="0"/>
-          <a:effectRef idx="0"/>
-          <a:fontRef idx="minor"/>
-        </p:style>
-        <p:txBody>
-          <a:bodyPr wrap="none" lIns="90000" rIns="90000" tIns="45000" bIns="45000" anchor="ctr"/>
-          <a:p>
-            <a:pPr algn="ctr">
-              <a:lnSpc>
-                <a:spcPct val="100000"/>
-              </a:lnSpc>
-            </a:pPr>
-            <a:r>
-              <a:rPr lang="en-US" sz="1800" spc="-1" strike="noStrike">
-                <a:solidFill>
-                  <a:srgbClr val="000000"/>
-                </a:solidFill>
-                <a:uFill>
-                  <a:solidFill>
-                    <a:srgbClr val="ffffff"/>
-                  </a:solidFill>
-                </a:uFill>
-                <a:latin typeface="Arial"/>
-                <a:ea typeface="DejaVu Sans"/>
-              </a:rPr>
-              <a:t>Users</a:t>
-            </a:r>
-            <a:endParaRPr lang="en-US" sz="1800" spc="-1" strike="noStrike">
-              <a:solidFill>
-                <a:srgbClr val="000000"/>
-              </a:solidFill>
-              <a:uFill>
-                <a:solidFill>
-                  <a:srgbClr val="ffffff"/>
-                </a:solidFill>
-              </a:uFill>
-              <a:latin typeface="Arial"/>
-            </a:endParaRPr>
-          </a:p>
-        </p:txBody>
-      </p:sp>
-      <p:sp>
-        <p:nvSpPr>
-          <p:cNvPr id="106" name="CustomShape 3"/>
-          <p:cNvSpPr/>
-          <p:nvPr/>
-        </p:nvSpPr>
-        <p:spPr>
-          <a:xfrm>
-            <a:off x="2194560" y="1645920"/>
-            <a:ext cx="2011320" cy="1554120"/>
-          </a:xfrm>
-          <a:prstGeom prst="rect">
-            <a:avLst/>
-          </a:prstGeom>
-          <a:solidFill>
-            <a:srgbClr val="729fcf"/>
-          </a:solidFill>
-          <a:ln>
-            <a:solidFill>
-              <a:srgbClr val="3465a4"/>
-            </a:solidFill>
-          </a:ln>
-        </p:spPr>
-        <p:style>
-          <a:lnRef idx="0"/>
-          <a:fillRef idx="0"/>
-          <a:effectRef idx="0"/>
-          <a:fontRef idx="minor"/>
-        </p:style>
-        <p:txBody>
-          <a:bodyPr wrap="none" lIns="90000" rIns="90000" tIns="45000" bIns="45000" anchor="ctr"/>
-          <a:p>
-            <a:pPr algn="ctr">
-              <a:lnSpc>
-                <a:spcPct val="100000"/>
-              </a:lnSpc>
-            </a:pPr>
-            <a:r>
-              <a:rPr lang="en-US" sz="1800" spc="-1" strike="noStrike">
-                <a:solidFill>
-                  <a:srgbClr val="000000"/>
-                </a:solidFill>
-                <a:uFill>
-                  <a:solidFill>
-                    <a:srgbClr val="ffffff"/>
-                  </a:solidFill>
-                </a:uFill>
-                <a:latin typeface="Arial"/>
-                <a:ea typeface="DejaVu Sans"/>
-              </a:rPr>
-              <a:t>Polls</a:t>
-            </a:r>
-            <a:endParaRPr lang="en-US" sz="1800" spc="-1" strike="noStrike">
-              <a:solidFill>
-                <a:srgbClr val="000000"/>
-              </a:solidFill>
-              <a:uFill>
-                <a:solidFill>
-                  <a:srgbClr val="ffffff"/>
-                </a:solidFill>
-              </a:uFill>
-              <a:latin typeface="Arial"/>
-            </a:endParaRPr>
-          </a:p>
-        </p:txBody>
-      </p:sp>
-      <p:sp>
-        <p:nvSpPr>
-          <p:cNvPr id="107" name="CustomShape 4"/>
-          <p:cNvSpPr/>
-          <p:nvPr/>
-        </p:nvSpPr>
-        <p:spPr>
-          <a:xfrm>
-            <a:off x="5943600" y="1645920"/>
-            <a:ext cx="2011320" cy="1554120"/>
-          </a:xfrm>
-          <a:prstGeom prst="rect">
-            <a:avLst/>
-          </a:prstGeom>
-          <a:solidFill>
-            <a:srgbClr val="729fcf"/>
-          </a:solidFill>
-          <a:ln>
-            <a:solidFill>
-              <a:srgbClr val="3465a4"/>
-            </a:solidFill>
-          </a:ln>
-        </p:spPr>
-        <p:style>
-          <a:lnRef idx="0"/>
-          <a:fillRef idx="0"/>
-          <a:effectRef idx="0"/>
-          <a:fontRef idx="minor"/>
-        </p:style>
-        <p:txBody>
-          <a:bodyPr wrap="none" lIns="90000" rIns="90000" tIns="45000" bIns="45000" anchor="ctr"/>
-          <a:p>
-            <a:pPr algn="ctr">
-              <a:lnSpc>
-                <a:spcPct val="100000"/>
-              </a:lnSpc>
-            </a:pPr>
-            <a:r>
-              <a:rPr lang="en-US" sz="1800" spc="-1" strike="noStrike">
-                <a:solidFill>
-                  <a:srgbClr val="000000"/>
-                </a:solidFill>
-                <a:uFill>
-                  <a:solidFill>
-                    <a:srgbClr val="ffffff"/>
-                  </a:solidFill>
-                </a:uFill>
-                <a:latin typeface="Arial"/>
-                <a:ea typeface="DejaVu Sans"/>
-              </a:rPr>
-              <a:t>Votes</a:t>
-            </a:r>
-            <a:endParaRPr lang="en-US" sz="1800" spc="-1" strike="noStrike">
-              <a:solidFill>
-                <a:srgbClr val="000000"/>
-              </a:solidFill>
-              <a:uFill>
-                <a:solidFill>
-                  <a:srgbClr val="ffffff"/>
-                </a:solidFill>
-              </a:uFill>
-              <a:latin typeface="Arial"/>
-            </a:endParaRPr>
-          </a:p>
-        </p:txBody>
-      </p:sp>
-      <p:sp>
-        <p:nvSpPr>
-          <p:cNvPr id="108" name="CustomShape 5"/>
-          <p:cNvSpPr/>
-          <p:nvPr/>
-        </p:nvSpPr>
-        <p:spPr>
-          <a:xfrm>
-            <a:off x="4206240" y="2423160"/>
-            <a:ext cx="1737360" cy="360"/>
-          </a:xfrm>
-          <a:prstGeom prst="bentConnector3">
-            <a:avLst>
-              <a:gd name="adj1" fmla="val 50000"/>
-            </a:avLst>
-          </a:prstGeom>
-          <a:noFill/>
-          <a:ln>
-            <a:solidFill>
-              <a:srgbClr val="000000"/>
-            </a:solidFill>
-            <a:tailEnd len="med" type="triangle" w="med"/>
-          </a:ln>
-        </p:spPr>
-        <p:style>
-          <a:lnRef idx="0"/>
-          <a:fillRef idx="0"/>
-          <a:effectRef idx="0"/>
-          <a:fontRef idx="minor"/>
-        </p:style>
-      </p:sp>
-      <p:sp>
-        <p:nvSpPr>
-          <p:cNvPr id="109" name="CustomShape 6"/>
-          <p:cNvSpPr/>
-          <p:nvPr/>
-        </p:nvSpPr>
-        <p:spPr>
-          <a:xfrm>
-            <a:off x="3657600" y="5120640"/>
-            <a:ext cx="273960" cy="345960"/>
-          </a:xfrm>
-          <a:prstGeom prst="rect">
-            <a:avLst/>
-          </a:prstGeom>
-          <a:noFill/>
-          <a:ln>
-            <a:noFill/>
-          </a:ln>
-        </p:spPr>
-        <p:style>
-          <a:lnRef idx="0"/>
-          <a:fillRef idx="0"/>
-          <a:effectRef idx="0"/>
-          <a:fontRef idx="minor"/>
-        </p:style>
-        <p:txBody>
-          <a:bodyPr lIns="90000" rIns="90000" tIns="45000" bIns="45000"/>
-          <a:p>
-            <a:r>
-              <a:rPr lang="en-US" sz="1800" spc="-1" strike="noStrike">
-                <a:solidFill>
-                  <a:srgbClr val="000000"/>
-                </a:solidFill>
-                <a:uFill>
-                  <a:solidFill>
-                    <a:srgbClr val="ffffff"/>
-                  </a:solidFill>
-                </a:uFill>
-                <a:latin typeface="Arial"/>
-              </a:rPr>
-              <a:t>1</a:t>
-            </a:r>
-            <a:endParaRPr lang="en-US" sz="1800" spc="-1" strike="noStrike">
-              <a:solidFill>
-                <a:srgbClr val="000000"/>
-              </a:solidFill>
-              <a:uFill>
-                <a:solidFill>
-                  <a:srgbClr val="ffffff"/>
-                </a:solidFill>
-              </a:uFill>
-              <a:latin typeface="Arial"/>
-            </a:endParaRPr>
-          </a:p>
-        </p:txBody>
-      </p:sp>
-      <p:sp>
-        <p:nvSpPr>
-          <p:cNvPr id="110" name="CustomShape 7"/>
-          <p:cNvSpPr/>
-          <p:nvPr/>
-        </p:nvSpPr>
-        <p:spPr>
-          <a:xfrm>
-            <a:off x="3200400" y="3311280"/>
-            <a:ext cx="273960" cy="345960"/>
-          </a:xfrm>
-          <a:prstGeom prst="rect">
-            <a:avLst/>
-          </a:prstGeom>
-          <a:noFill/>
-          <a:ln>
-            <a:noFill/>
-          </a:ln>
-        </p:spPr>
-        <p:style>
-          <a:lnRef idx="0"/>
-          <a:fillRef idx="0"/>
-          <a:effectRef idx="0"/>
-          <a:fontRef idx="minor"/>
-        </p:style>
-        <p:txBody>
-          <a:bodyPr lIns="90000" rIns="90000" tIns="45000" bIns="45000"/>
-          <a:p>
-            <a:r>
-              <a:rPr lang="en-US" sz="1800" spc="-1" strike="noStrike">
-                <a:solidFill>
-                  <a:srgbClr val="000000"/>
-                </a:solidFill>
-                <a:uFill>
-                  <a:solidFill>
-                    <a:srgbClr val="ffffff"/>
-                  </a:solidFill>
-                </a:uFill>
-                <a:latin typeface="Arial"/>
-              </a:rPr>
-              <a:t>*</a:t>
-            </a:r>
-            <a:endParaRPr lang="en-US" sz="1800" spc="-1" strike="noStrike">
-              <a:solidFill>
-                <a:srgbClr val="000000"/>
-              </a:solidFill>
-              <a:uFill>
-                <a:solidFill>
-                  <a:srgbClr val="ffffff"/>
-                </a:solidFill>
-              </a:uFill>
-              <a:latin typeface="Arial"/>
-            </a:endParaRPr>
-          </a:p>
-        </p:txBody>
-      </p:sp>
-      <p:sp>
-        <p:nvSpPr>
-          <p:cNvPr id="111" name="CustomShape 8"/>
-          <p:cNvSpPr/>
-          <p:nvPr/>
-        </p:nvSpPr>
-        <p:spPr>
-          <a:xfrm>
-            <a:off x="4297680" y="2103120"/>
-            <a:ext cx="273960" cy="345960"/>
-          </a:xfrm>
-          <a:prstGeom prst="rect">
-            <a:avLst/>
-          </a:prstGeom>
-          <a:noFill/>
-          <a:ln>
-            <a:noFill/>
-          </a:ln>
-        </p:spPr>
-        <p:style>
-          <a:lnRef idx="0"/>
-          <a:fillRef idx="0"/>
-          <a:effectRef idx="0"/>
-          <a:fontRef idx="minor"/>
-        </p:style>
-        <p:txBody>
-          <a:bodyPr lIns="90000" rIns="90000" tIns="45000" bIns="45000"/>
-          <a:p>
-            <a:r>
-              <a:rPr lang="en-US" sz="1800" spc="-1" strike="noStrike">
-                <a:solidFill>
-                  <a:srgbClr val="000000"/>
-                </a:solidFill>
-                <a:uFill>
-                  <a:solidFill>
-                    <a:srgbClr val="ffffff"/>
-                  </a:solidFill>
-                </a:uFill>
-                <a:latin typeface="Arial"/>
-              </a:rPr>
-              <a:t>1</a:t>
-            </a:r>
-            <a:endParaRPr lang="en-US" sz="1800" spc="-1" strike="noStrike">
-              <a:solidFill>
-                <a:srgbClr val="000000"/>
-              </a:solidFill>
-              <a:uFill>
-                <a:solidFill>
-                  <a:srgbClr val="ffffff"/>
-                </a:solidFill>
-              </a:uFill>
-              <a:latin typeface="Arial"/>
-            </a:endParaRPr>
-          </a:p>
-        </p:txBody>
-      </p:sp>
-      <p:sp>
-        <p:nvSpPr>
-          <p:cNvPr id="112" name="CustomShape 9"/>
-          <p:cNvSpPr/>
-          <p:nvPr/>
-        </p:nvSpPr>
-        <p:spPr>
-          <a:xfrm>
-            <a:off x="5577840" y="2076840"/>
-            <a:ext cx="273960" cy="345960"/>
-          </a:xfrm>
-          <a:prstGeom prst="rect">
-            <a:avLst/>
-          </a:prstGeom>
-          <a:noFill/>
-          <a:ln>
-            <a:noFill/>
-          </a:ln>
-        </p:spPr>
-        <p:style>
-          <a:lnRef idx="0"/>
-          <a:fillRef idx="0"/>
-          <a:effectRef idx="0"/>
-          <a:fontRef idx="minor"/>
-        </p:style>
-        <p:txBody>
-          <a:bodyPr lIns="90000" rIns="90000" tIns="45000" bIns="45000"/>
-          <a:p>
-            <a:r>
-              <a:rPr lang="en-US" sz="1800" spc="-1" strike="noStrike">
-                <a:solidFill>
-                  <a:srgbClr val="000000"/>
-                </a:solidFill>
-                <a:uFill>
-                  <a:solidFill>
-                    <a:srgbClr val="ffffff"/>
-                  </a:solidFill>
-                </a:uFill>
-                <a:latin typeface="Arial"/>
-              </a:rPr>
-              <a:t>*</a:t>
-            </a:r>
-            <a:endParaRPr lang="en-US" sz="1800" spc="-1" strike="noStrike">
-              <a:solidFill>
-                <a:srgbClr val="000000"/>
-              </a:solidFill>
-              <a:uFill>
-                <a:solidFill>
-                  <a:srgbClr val="ffffff"/>
-                </a:solidFill>
-              </a:uFill>
-              <a:latin typeface="Arial"/>
-            </a:endParaRPr>
-          </a:p>
-        </p:txBody>
-      </p:sp>
-      <p:sp>
-        <p:nvSpPr>
-          <p:cNvPr id="113" name="CustomShape 10"/>
-          <p:cNvSpPr/>
-          <p:nvPr/>
-        </p:nvSpPr>
-        <p:spPr>
-          <a:xfrm>
-            <a:off x="7040880" y="3291840"/>
-            <a:ext cx="273960" cy="345960"/>
-          </a:xfrm>
-          <a:prstGeom prst="rect">
-            <a:avLst/>
-          </a:prstGeom>
-          <a:noFill/>
-          <a:ln>
-            <a:noFill/>
-          </a:ln>
-        </p:spPr>
-        <p:style>
-          <a:lnRef idx="0"/>
-          <a:fillRef idx="0"/>
-          <a:effectRef idx="0"/>
-          <a:fontRef idx="minor"/>
-        </p:style>
-        <p:txBody>
-          <a:bodyPr lIns="90000" rIns="90000" tIns="45000" bIns="45000"/>
-          <a:p>
-            <a:r>
-              <a:rPr lang="en-US" sz="1800" spc="-1" strike="noStrike">
-                <a:solidFill>
-                  <a:srgbClr val="000000"/>
-                </a:solidFill>
-                <a:uFill>
-                  <a:solidFill>
-                    <a:srgbClr val="ffffff"/>
-                  </a:solidFill>
-                </a:uFill>
-                <a:latin typeface="Arial"/>
-              </a:rPr>
-              <a:t>*</a:t>
-            </a:r>
-            <a:endParaRPr lang="en-US" sz="1800" spc="-1" strike="noStrike">
-              <a:solidFill>
-                <a:srgbClr val="000000"/>
-              </a:solidFill>
-              <a:uFill>
-                <a:solidFill>
-                  <a:srgbClr val="ffffff"/>
-                </a:solidFill>
-              </a:uFill>
-              <a:latin typeface="Arial"/>
-            </a:endParaRPr>
-          </a:p>
-        </p:txBody>
-      </p:sp>
-      <p:sp>
-        <p:nvSpPr>
-          <p:cNvPr id="114" name="CustomShape 11"/>
-          <p:cNvSpPr/>
-          <p:nvPr/>
-        </p:nvSpPr>
-        <p:spPr>
-          <a:xfrm>
-            <a:off x="6126480" y="5048640"/>
-            <a:ext cx="273960" cy="345960"/>
-          </a:xfrm>
-          <a:prstGeom prst="rect">
-            <a:avLst/>
-          </a:prstGeom>
-          <a:noFill/>
-          <a:ln>
-            <a:noFill/>
-          </a:ln>
-        </p:spPr>
-        <p:style>
-          <a:lnRef idx="0"/>
-          <a:fillRef idx="0"/>
-          <a:effectRef idx="0"/>
-          <a:fontRef idx="minor"/>
-        </p:style>
-        <p:txBody>
-          <a:bodyPr lIns="90000" rIns="90000" tIns="45000" bIns="45000"/>
-          <a:p>
-            <a:r>
-              <a:rPr lang="en-US" sz="1800" spc="-1" strike="noStrike">
-                <a:solidFill>
-                  <a:srgbClr val="000000"/>
-                </a:solidFill>
-                <a:uFill>
-                  <a:solidFill>
-                    <a:srgbClr val="ffffff"/>
-                  </a:solidFill>
-                </a:uFill>
-                <a:latin typeface="Arial"/>
-              </a:rPr>
-              <a:t>1</a:t>
-            </a:r>
-            <a:endParaRPr lang="en-US" sz="1800" spc="-1" strike="noStrike">
-              <a:solidFill>
-                <a:srgbClr val="000000"/>
-              </a:solidFill>
-              <a:uFill>
-                <a:solidFill>
-                  <a:srgbClr val="ffffff"/>
-                </a:solidFill>
-              </a:uFill>
-              <a:latin typeface="Arial"/>
-            </a:endParaRPr>
-          </a:p>
-        </p:txBody>
-      </p:sp>
-      <p:sp>
-        <p:nvSpPr>
-          <p:cNvPr id="115" name="CustomShape 12"/>
-          <p:cNvSpPr/>
-          <p:nvPr/>
-        </p:nvSpPr>
-        <p:spPr>
-          <a:xfrm>
-            <a:off x="274680" y="4023360"/>
-            <a:ext cx="2011320" cy="1554120"/>
+            <a:off x="1160640" y="1645920"/>
+            <a:ext cx="1645920" cy="1280160"/>
           </a:xfrm>
           <a:prstGeom prst="rect">
             <a:avLst/>
@@ -7031,7 +6293,7 @@
       </p:sp>
       <p:cxnSp>
         <p:nvCxnSpPr>
-          <p:cNvPr id="116" name="Line 13"/>
+          <p:cNvPr id="103" name="Line 10"/>
           <p:cNvCxnSpPr/>
           <p:nvPr/>
         </p:nvCxnSpPr>
@@ -7053,13 +6315,13 @@
       </p:cxnSp>
       <p:sp>
         <p:nvSpPr>
-          <p:cNvPr id="117" name="CustomShape 14"/>
+          <p:cNvPr id="104" name="CustomShape 11"/>
           <p:cNvSpPr/>
           <p:nvPr/>
         </p:nvSpPr>
         <p:spPr>
           <a:xfrm>
-            <a:off x="1829160" y="2011680"/>
+            <a:off x="3704400" y="1940040"/>
             <a:ext cx="273960" cy="345960"/>
           </a:xfrm>
           <a:prstGeom prst="rect">
@@ -7109,13 +6371,13 @@
       </p:sp>
       <p:sp>
         <p:nvSpPr>
-          <p:cNvPr id="118" name="CustomShape 15"/>
+          <p:cNvPr id="105" name="CustomShape 12"/>
           <p:cNvSpPr/>
           <p:nvPr/>
         </p:nvSpPr>
         <p:spPr>
           <a:xfrm>
-            <a:off x="914400" y="3657600"/>
+            <a:off x="2881440" y="2011680"/>
             <a:ext cx="273960" cy="345960"/>
           </a:xfrm>
           <a:prstGeom prst="rect">
@@ -7165,7 +6427,7 @@
       </p:sp>
       <p:cxnSp>
         <p:nvCxnSpPr>
-          <p:cNvPr id="119" name="Line 16"/>
+          <p:cNvPr id="106" name="Line 13"/>
           <p:cNvCxnSpPr/>
           <p:nvPr/>
         </p:nvCxnSpPr>
@@ -7187,7 +6449,7 @@
       </p:cxnSp>
       <p:cxnSp>
         <p:nvCxnSpPr>
-          <p:cNvPr id="120" name="Line 17"/>
+          <p:cNvPr id="107" name="Line 14"/>
           <p:cNvCxnSpPr/>
           <p:nvPr/>
         </p:nvCxnSpPr>
@@ -7212,10 +6474,10 @@
   <p:timing>
     <p:tnLst>
       <p:par>
-        <p:cTn id="13" dur="indefinite" restart="never" nodeType="tmRoot">
+        <p:cTn id="11" dur="indefinite" restart="never" nodeType="tmRoot">
           <p:childTnLst>
             <p:seq>
-              <p:cTn id="14" nodeType="mainSeq"/>
+              <p:cTn id="12" nodeType="mainSeq"/>
               <p:prevCondLst>
                 <p:cond delay="0" evt="onPrev">
                   <p:tgtEl>

</xml_diff>

<commit_message>
Updated controllers. Update still not working
</commit_message>
<xml_diff>
--- a/_Docs/Poll_it_wireframe.pptx
+++ b/_Docs/Poll_it_wireframe.pptx
@@ -70,7 +70,7 @@
         <p:spPr>
           <a:xfrm>
             <a:off x="504000" y="301320"/>
-            <a:ext cx="9071280" cy="1261800"/>
+            <a:ext cx="9072000" cy="1261800"/>
           </a:xfrm>
           <a:prstGeom prst="rect">
             <a:avLst/>
@@ -106,8 +106,8 @@
         </p:nvSpPr>
         <p:spPr>
           <a:xfrm>
-            <a:off x="504000" y="1769040"/>
-            <a:ext cx="9071280" cy="2090880"/>
+            <a:off x="504000" y="1768680"/>
+            <a:ext cx="9072000" cy="2090880"/>
           </a:xfrm>
           <a:prstGeom prst="rect">
             <a:avLst/>
@@ -142,8 +142,8 @@
         </p:nvSpPr>
         <p:spPr>
           <a:xfrm>
-            <a:off x="504000" y="4059000"/>
-            <a:ext cx="9071280" cy="2090880"/>
+            <a:off x="504000" y="4058640"/>
+            <a:ext cx="9072000" cy="2090880"/>
           </a:xfrm>
           <a:prstGeom prst="rect">
             <a:avLst/>
@@ -201,7 +201,7 @@
         <p:spPr>
           <a:xfrm>
             <a:off x="504000" y="301320"/>
-            <a:ext cx="9071280" cy="1261800"/>
+            <a:ext cx="9072000" cy="1261800"/>
           </a:xfrm>
           <a:prstGeom prst="rect">
             <a:avLst/>
@@ -237,8 +237,8 @@
         </p:nvSpPr>
         <p:spPr>
           <a:xfrm>
-            <a:off x="504000" y="1769040"/>
-            <a:ext cx="4426560" cy="2090880"/>
+            <a:off x="504000" y="1768680"/>
+            <a:ext cx="4426920" cy="2090880"/>
           </a:xfrm>
           <a:prstGeom prst="rect">
             <a:avLst/>
@@ -273,8 +273,8 @@
         </p:nvSpPr>
         <p:spPr>
           <a:xfrm>
-            <a:off x="5152320" y="1769040"/>
-            <a:ext cx="4426560" cy="2090880"/>
+            <a:off x="5152680" y="1768680"/>
+            <a:ext cx="4426920" cy="2090880"/>
           </a:xfrm>
           <a:prstGeom prst="rect">
             <a:avLst/>
@@ -309,8 +309,8 @@
         </p:nvSpPr>
         <p:spPr>
           <a:xfrm>
-            <a:off x="5152320" y="4059000"/>
-            <a:ext cx="4426560" cy="2090880"/>
+            <a:off x="5152680" y="4058640"/>
+            <a:ext cx="4426920" cy="2090880"/>
           </a:xfrm>
           <a:prstGeom prst="rect">
             <a:avLst/>
@@ -345,8 +345,8 @@
         </p:nvSpPr>
         <p:spPr>
           <a:xfrm>
-            <a:off x="504000" y="4059000"/>
-            <a:ext cx="4426560" cy="2090880"/>
+            <a:off x="504000" y="4058640"/>
+            <a:ext cx="4426920" cy="2090880"/>
           </a:xfrm>
           <a:prstGeom prst="rect">
             <a:avLst/>
@@ -404,7 +404,7 @@
         <p:spPr>
           <a:xfrm>
             <a:off x="504000" y="301320"/>
-            <a:ext cx="9071280" cy="1261800"/>
+            <a:ext cx="9072000" cy="1261800"/>
           </a:xfrm>
           <a:prstGeom prst="rect">
             <a:avLst/>
@@ -440,8 +440,8 @@
         </p:nvSpPr>
         <p:spPr>
           <a:xfrm>
-            <a:off x="504000" y="1769040"/>
-            <a:ext cx="9071280" cy="4384080"/>
+            <a:off x="504000" y="1768680"/>
+            <a:ext cx="9072000" cy="4384080"/>
           </a:xfrm>
           <a:prstGeom prst="rect">
             <a:avLst/>
@@ -476,8 +476,8 @@
         </p:nvSpPr>
         <p:spPr>
           <a:xfrm>
-            <a:off x="504000" y="1769040"/>
-            <a:ext cx="9071280" cy="4384080"/>
+            <a:off x="504000" y="1768680"/>
+            <a:ext cx="9072000" cy="4384080"/>
           </a:xfrm>
           <a:prstGeom prst="rect">
             <a:avLst/>
@@ -512,7 +512,7 @@
         </p:blipFill>
         <p:spPr>
           <a:xfrm>
-            <a:off x="2292120" y="1769040"/>
+            <a:off x="2292480" y="1768680"/>
             <a:ext cx="5494680" cy="4384080"/>
           </a:xfrm>
           <a:prstGeom prst="rect">
@@ -535,7 +535,7 @@
         </p:blipFill>
         <p:spPr>
           <a:xfrm>
-            <a:off x="2292120" y="1769040"/>
+            <a:off x="2292480" y="1768680"/>
             <a:ext cx="5494680" cy="4384080"/>
           </a:xfrm>
           <a:prstGeom prst="rect">
@@ -603,7 +603,7 @@
         <p:spPr>
           <a:xfrm>
             <a:off x="504000" y="301320"/>
-            <a:ext cx="9071280" cy="1261800"/>
+            <a:ext cx="9072000" cy="1261800"/>
           </a:xfrm>
           <a:prstGeom prst="rect">
             <a:avLst/>
@@ -639,8 +639,8 @@
         </p:nvSpPr>
         <p:spPr>
           <a:xfrm>
-            <a:off x="504000" y="1769040"/>
-            <a:ext cx="9071280" cy="4384080"/>
+            <a:off x="504000" y="1768680"/>
+            <a:ext cx="9072000" cy="4384080"/>
           </a:xfrm>
           <a:prstGeom prst="rect">
             <a:avLst/>
@@ -699,7 +699,7 @@
         <p:spPr>
           <a:xfrm>
             <a:off x="504000" y="301320"/>
-            <a:ext cx="9071280" cy="1261800"/>
+            <a:ext cx="9072000" cy="1261800"/>
           </a:xfrm>
           <a:prstGeom prst="rect">
             <a:avLst/>
@@ -735,8 +735,8 @@
         </p:nvSpPr>
         <p:spPr>
           <a:xfrm>
-            <a:off x="504000" y="1769040"/>
-            <a:ext cx="9071280" cy="4384080"/>
+            <a:off x="504000" y="1768680"/>
+            <a:ext cx="9072000" cy="4384080"/>
           </a:xfrm>
           <a:prstGeom prst="rect">
             <a:avLst/>
@@ -794,7 +794,7 @@
         <p:spPr>
           <a:xfrm>
             <a:off x="504000" y="301320"/>
-            <a:ext cx="9071280" cy="1261800"/>
+            <a:ext cx="9072000" cy="1261800"/>
           </a:xfrm>
           <a:prstGeom prst="rect">
             <a:avLst/>
@@ -830,8 +830,8 @@
         </p:nvSpPr>
         <p:spPr>
           <a:xfrm>
-            <a:off x="504000" y="1769040"/>
-            <a:ext cx="4426560" cy="4384080"/>
+            <a:off x="504000" y="1768680"/>
+            <a:ext cx="4426920" cy="4384080"/>
           </a:xfrm>
           <a:prstGeom prst="rect">
             <a:avLst/>
@@ -866,8 +866,8 @@
         </p:nvSpPr>
         <p:spPr>
           <a:xfrm>
-            <a:off x="5152320" y="1769040"/>
-            <a:ext cx="4426560" cy="4384080"/>
+            <a:off x="5152680" y="1768680"/>
+            <a:ext cx="4426920" cy="4384080"/>
           </a:xfrm>
           <a:prstGeom prst="rect">
             <a:avLst/>
@@ -925,7 +925,7 @@
         <p:spPr>
           <a:xfrm>
             <a:off x="504000" y="301320"/>
-            <a:ext cx="9071280" cy="1261800"/>
+            <a:ext cx="9072000" cy="1261800"/>
           </a:xfrm>
           <a:prstGeom prst="rect">
             <a:avLst/>
@@ -984,7 +984,7 @@
         <p:spPr>
           <a:xfrm>
             <a:off x="504000" y="301320"/>
-            <a:ext cx="9071280" cy="5850360"/>
+            <a:ext cx="9072000" cy="5850360"/>
           </a:xfrm>
           <a:prstGeom prst="rect">
             <a:avLst/>
@@ -1043,7 +1043,7 @@
         <p:spPr>
           <a:xfrm>
             <a:off x="504000" y="301320"/>
-            <a:ext cx="9071280" cy="1261800"/>
+            <a:ext cx="9072000" cy="1261800"/>
           </a:xfrm>
           <a:prstGeom prst="rect">
             <a:avLst/>
@@ -1079,8 +1079,8 @@
         </p:nvSpPr>
         <p:spPr>
           <a:xfrm>
-            <a:off x="504000" y="1769040"/>
-            <a:ext cx="4426560" cy="2090880"/>
+            <a:off x="504000" y="1768680"/>
+            <a:ext cx="4426920" cy="2090880"/>
           </a:xfrm>
           <a:prstGeom prst="rect">
             <a:avLst/>
@@ -1115,8 +1115,8 @@
         </p:nvSpPr>
         <p:spPr>
           <a:xfrm>
-            <a:off x="504000" y="4059000"/>
-            <a:ext cx="4426560" cy="2090880"/>
+            <a:off x="504000" y="4058640"/>
+            <a:ext cx="4426920" cy="2090880"/>
           </a:xfrm>
           <a:prstGeom prst="rect">
             <a:avLst/>
@@ -1151,8 +1151,8 @@
         </p:nvSpPr>
         <p:spPr>
           <a:xfrm>
-            <a:off x="5152320" y="1769040"/>
-            <a:ext cx="4426560" cy="4384080"/>
+            <a:off x="5152680" y="1768680"/>
+            <a:ext cx="4426920" cy="4384080"/>
           </a:xfrm>
           <a:prstGeom prst="rect">
             <a:avLst/>
@@ -1210,7 +1210,7 @@
         <p:spPr>
           <a:xfrm>
             <a:off x="504000" y="301320"/>
-            <a:ext cx="9071280" cy="1261800"/>
+            <a:ext cx="9072000" cy="1261800"/>
           </a:xfrm>
           <a:prstGeom prst="rect">
             <a:avLst/>
@@ -1246,8 +1246,8 @@
         </p:nvSpPr>
         <p:spPr>
           <a:xfrm>
-            <a:off x="504000" y="1769040"/>
-            <a:ext cx="9071280" cy="4384080"/>
+            <a:off x="504000" y="1768680"/>
+            <a:ext cx="9072000" cy="4384080"/>
           </a:xfrm>
           <a:prstGeom prst="rect">
             <a:avLst/>
@@ -1306,7 +1306,7 @@
         <p:spPr>
           <a:xfrm>
             <a:off x="504000" y="301320"/>
-            <a:ext cx="9071280" cy="1261800"/>
+            <a:ext cx="9072000" cy="1261800"/>
           </a:xfrm>
           <a:prstGeom prst="rect">
             <a:avLst/>
@@ -1342,8 +1342,8 @@
         </p:nvSpPr>
         <p:spPr>
           <a:xfrm>
-            <a:off x="504000" y="1769040"/>
-            <a:ext cx="4426560" cy="4384080"/>
+            <a:off x="504000" y="1768680"/>
+            <a:ext cx="4426920" cy="4384080"/>
           </a:xfrm>
           <a:prstGeom prst="rect">
             <a:avLst/>
@@ -1378,8 +1378,8 @@
         </p:nvSpPr>
         <p:spPr>
           <a:xfrm>
-            <a:off x="5152320" y="1769040"/>
-            <a:ext cx="4426560" cy="2090880"/>
+            <a:off x="5152680" y="1768680"/>
+            <a:ext cx="4426920" cy="2090880"/>
           </a:xfrm>
           <a:prstGeom prst="rect">
             <a:avLst/>
@@ -1414,8 +1414,8 @@
         </p:nvSpPr>
         <p:spPr>
           <a:xfrm>
-            <a:off x="5152320" y="4059000"/>
-            <a:ext cx="4426560" cy="2090880"/>
+            <a:off x="5152680" y="4058640"/>
+            <a:ext cx="4426920" cy="2090880"/>
           </a:xfrm>
           <a:prstGeom prst="rect">
             <a:avLst/>
@@ -1473,7 +1473,7 @@
         <p:spPr>
           <a:xfrm>
             <a:off x="504000" y="301320"/>
-            <a:ext cx="9071280" cy="1261800"/>
+            <a:ext cx="9072000" cy="1261800"/>
           </a:xfrm>
           <a:prstGeom prst="rect">
             <a:avLst/>
@@ -1509,8 +1509,8 @@
         </p:nvSpPr>
         <p:spPr>
           <a:xfrm>
-            <a:off x="504000" y="1769040"/>
-            <a:ext cx="4426560" cy="2090880"/>
+            <a:off x="504000" y="1768680"/>
+            <a:ext cx="4426920" cy="2090880"/>
           </a:xfrm>
           <a:prstGeom prst="rect">
             <a:avLst/>
@@ -1545,8 +1545,8 @@
         </p:nvSpPr>
         <p:spPr>
           <a:xfrm>
-            <a:off x="5152320" y="1769040"/>
-            <a:ext cx="4426560" cy="2090880"/>
+            <a:off x="5152680" y="1768680"/>
+            <a:ext cx="4426920" cy="2090880"/>
           </a:xfrm>
           <a:prstGeom prst="rect">
             <a:avLst/>
@@ -1581,8 +1581,8 @@
         </p:nvSpPr>
         <p:spPr>
           <a:xfrm>
-            <a:off x="504000" y="4059000"/>
-            <a:ext cx="9071280" cy="2090880"/>
+            <a:off x="504000" y="4058640"/>
+            <a:ext cx="9072000" cy="2090880"/>
           </a:xfrm>
           <a:prstGeom prst="rect">
             <a:avLst/>
@@ -1640,7 +1640,7 @@
         <p:spPr>
           <a:xfrm>
             <a:off x="504000" y="301320"/>
-            <a:ext cx="9071280" cy="1261800"/>
+            <a:ext cx="9072000" cy="1261800"/>
           </a:xfrm>
           <a:prstGeom prst="rect">
             <a:avLst/>
@@ -1676,8 +1676,8 @@
         </p:nvSpPr>
         <p:spPr>
           <a:xfrm>
-            <a:off x="504000" y="1769040"/>
-            <a:ext cx="9071280" cy="2090880"/>
+            <a:off x="504000" y="1768680"/>
+            <a:ext cx="9072000" cy="2090880"/>
           </a:xfrm>
           <a:prstGeom prst="rect">
             <a:avLst/>
@@ -1712,8 +1712,8 @@
         </p:nvSpPr>
         <p:spPr>
           <a:xfrm>
-            <a:off x="504000" y="4059000"/>
-            <a:ext cx="9071280" cy="2090880"/>
+            <a:off x="504000" y="4058640"/>
+            <a:ext cx="9072000" cy="2090880"/>
           </a:xfrm>
           <a:prstGeom prst="rect">
             <a:avLst/>
@@ -1771,7 +1771,7 @@
         <p:spPr>
           <a:xfrm>
             <a:off x="504000" y="301320"/>
-            <a:ext cx="9071280" cy="1261800"/>
+            <a:ext cx="9072000" cy="1261800"/>
           </a:xfrm>
           <a:prstGeom prst="rect">
             <a:avLst/>
@@ -1807,8 +1807,8 @@
         </p:nvSpPr>
         <p:spPr>
           <a:xfrm>
-            <a:off x="504000" y="1769040"/>
-            <a:ext cx="4426560" cy="2090880"/>
+            <a:off x="504000" y="1768680"/>
+            <a:ext cx="4426920" cy="2090880"/>
           </a:xfrm>
           <a:prstGeom prst="rect">
             <a:avLst/>
@@ -1843,8 +1843,8 @@
         </p:nvSpPr>
         <p:spPr>
           <a:xfrm>
-            <a:off x="5152320" y="1769040"/>
-            <a:ext cx="4426560" cy="2090880"/>
+            <a:off x="5152680" y="1768680"/>
+            <a:ext cx="4426920" cy="2090880"/>
           </a:xfrm>
           <a:prstGeom prst="rect">
             <a:avLst/>
@@ -1879,8 +1879,8 @@
         </p:nvSpPr>
         <p:spPr>
           <a:xfrm>
-            <a:off x="5152320" y="4059000"/>
-            <a:ext cx="4426560" cy="2090880"/>
+            <a:off x="5152680" y="4058640"/>
+            <a:ext cx="4426920" cy="2090880"/>
           </a:xfrm>
           <a:prstGeom prst="rect">
             <a:avLst/>
@@ -1915,8 +1915,8 @@
         </p:nvSpPr>
         <p:spPr>
           <a:xfrm>
-            <a:off x="504000" y="4059000"/>
-            <a:ext cx="4426560" cy="2090880"/>
+            <a:off x="504000" y="4058640"/>
+            <a:ext cx="4426920" cy="2090880"/>
           </a:xfrm>
           <a:prstGeom prst="rect">
             <a:avLst/>
@@ -1974,7 +1974,7 @@
         <p:spPr>
           <a:xfrm>
             <a:off x="504000" y="301320"/>
-            <a:ext cx="9071280" cy="1261800"/>
+            <a:ext cx="9072000" cy="1261800"/>
           </a:xfrm>
           <a:prstGeom prst="rect">
             <a:avLst/>
@@ -2010,8 +2010,8 @@
         </p:nvSpPr>
         <p:spPr>
           <a:xfrm>
-            <a:off x="504000" y="1769040"/>
-            <a:ext cx="9071280" cy="4384080"/>
+            <a:off x="504000" y="1768680"/>
+            <a:ext cx="9072000" cy="4384080"/>
           </a:xfrm>
           <a:prstGeom prst="rect">
             <a:avLst/>
@@ -2046,8 +2046,8 @@
         </p:nvSpPr>
         <p:spPr>
           <a:xfrm>
-            <a:off x="504000" y="1769040"/>
-            <a:ext cx="9071280" cy="4384080"/>
+            <a:off x="504000" y="1768680"/>
+            <a:ext cx="9072000" cy="4384080"/>
           </a:xfrm>
           <a:prstGeom prst="rect">
             <a:avLst/>
@@ -2082,7 +2082,7 @@
         </p:blipFill>
         <p:spPr>
           <a:xfrm>
-            <a:off x="2292120" y="1769040"/>
+            <a:off x="2292480" y="1768680"/>
             <a:ext cx="5494680" cy="4384080"/>
           </a:xfrm>
           <a:prstGeom prst="rect">
@@ -2105,7 +2105,7 @@
         </p:blipFill>
         <p:spPr>
           <a:xfrm>
-            <a:off x="2292120" y="1769040"/>
+            <a:off x="2292480" y="1768680"/>
             <a:ext cx="5494680" cy="4384080"/>
           </a:xfrm>
           <a:prstGeom prst="rect">
@@ -2151,7 +2151,7 @@
         <p:spPr>
           <a:xfrm>
             <a:off x="504000" y="301320"/>
-            <a:ext cx="9071280" cy="1261800"/>
+            <a:ext cx="9072000" cy="1261800"/>
           </a:xfrm>
           <a:prstGeom prst="rect">
             <a:avLst/>
@@ -2187,8 +2187,8 @@
         </p:nvSpPr>
         <p:spPr>
           <a:xfrm>
-            <a:off x="504000" y="1769040"/>
-            <a:ext cx="9071280" cy="4384080"/>
+            <a:off x="504000" y="1768680"/>
+            <a:ext cx="9072000" cy="4384080"/>
           </a:xfrm>
           <a:prstGeom prst="rect">
             <a:avLst/>
@@ -2246,7 +2246,7 @@
         <p:spPr>
           <a:xfrm>
             <a:off x="504000" y="301320"/>
-            <a:ext cx="9071280" cy="1261800"/>
+            <a:ext cx="9072000" cy="1261800"/>
           </a:xfrm>
           <a:prstGeom prst="rect">
             <a:avLst/>
@@ -2282,8 +2282,8 @@
         </p:nvSpPr>
         <p:spPr>
           <a:xfrm>
-            <a:off x="504000" y="1769040"/>
-            <a:ext cx="4426560" cy="4384080"/>
+            <a:off x="504000" y="1768680"/>
+            <a:ext cx="4426920" cy="4384080"/>
           </a:xfrm>
           <a:prstGeom prst="rect">
             <a:avLst/>
@@ -2318,8 +2318,8 @@
         </p:nvSpPr>
         <p:spPr>
           <a:xfrm>
-            <a:off x="5152320" y="1769040"/>
-            <a:ext cx="4426560" cy="4384080"/>
+            <a:off x="5152680" y="1768680"/>
+            <a:ext cx="4426920" cy="4384080"/>
           </a:xfrm>
           <a:prstGeom prst="rect">
             <a:avLst/>
@@ -2377,7 +2377,7 @@
         <p:spPr>
           <a:xfrm>
             <a:off x="504000" y="301320"/>
-            <a:ext cx="9071280" cy="1261800"/>
+            <a:ext cx="9072000" cy="1261800"/>
           </a:xfrm>
           <a:prstGeom prst="rect">
             <a:avLst/>
@@ -2436,7 +2436,7 @@
         <p:spPr>
           <a:xfrm>
             <a:off x="504000" y="301320"/>
-            <a:ext cx="9071280" cy="5850360"/>
+            <a:ext cx="9072000" cy="5850360"/>
           </a:xfrm>
           <a:prstGeom prst="rect">
             <a:avLst/>
@@ -2495,7 +2495,7 @@
         <p:spPr>
           <a:xfrm>
             <a:off x="504000" y="301320"/>
-            <a:ext cx="9071280" cy="1261800"/>
+            <a:ext cx="9072000" cy="1261800"/>
           </a:xfrm>
           <a:prstGeom prst="rect">
             <a:avLst/>
@@ -2531,8 +2531,8 @@
         </p:nvSpPr>
         <p:spPr>
           <a:xfrm>
-            <a:off x="504000" y="1769040"/>
-            <a:ext cx="4426560" cy="2090880"/>
+            <a:off x="504000" y="1768680"/>
+            <a:ext cx="4426920" cy="2090880"/>
           </a:xfrm>
           <a:prstGeom prst="rect">
             <a:avLst/>
@@ -2567,8 +2567,8 @@
         </p:nvSpPr>
         <p:spPr>
           <a:xfrm>
-            <a:off x="504000" y="4059000"/>
-            <a:ext cx="4426560" cy="2090880"/>
+            <a:off x="504000" y="4058640"/>
+            <a:ext cx="4426920" cy="2090880"/>
           </a:xfrm>
           <a:prstGeom prst="rect">
             <a:avLst/>
@@ -2603,8 +2603,8 @@
         </p:nvSpPr>
         <p:spPr>
           <a:xfrm>
-            <a:off x="5152320" y="1769040"/>
-            <a:ext cx="4426560" cy="4384080"/>
+            <a:off x="5152680" y="1768680"/>
+            <a:ext cx="4426920" cy="4384080"/>
           </a:xfrm>
           <a:prstGeom prst="rect">
             <a:avLst/>
@@ -2662,7 +2662,7 @@
         <p:spPr>
           <a:xfrm>
             <a:off x="504000" y="301320"/>
-            <a:ext cx="9071280" cy="1261800"/>
+            <a:ext cx="9072000" cy="1261800"/>
           </a:xfrm>
           <a:prstGeom prst="rect">
             <a:avLst/>
@@ -2698,8 +2698,8 @@
         </p:nvSpPr>
         <p:spPr>
           <a:xfrm>
-            <a:off x="504000" y="1769040"/>
-            <a:ext cx="4426560" cy="4384080"/>
+            <a:off x="504000" y="1768680"/>
+            <a:ext cx="4426920" cy="4384080"/>
           </a:xfrm>
           <a:prstGeom prst="rect">
             <a:avLst/>
@@ -2734,8 +2734,8 @@
         </p:nvSpPr>
         <p:spPr>
           <a:xfrm>
-            <a:off x="5152320" y="1769040"/>
-            <a:ext cx="4426560" cy="2090880"/>
+            <a:off x="5152680" y="1768680"/>
+            <a:ext cx="4426920" cy="2090880"/>
           </a:xfrm>
           <a:prstGeom prst="rect">
             <a:avLst/>
@@ -2770,8 +2770,8 @@
         </p:nvSpPr>
         <p:spPr>
           <a:xfrm>
-            <a:off x="5152320" y="4059000"/>
-            <a:ext cx="4426560" cy="2090880"/>
+            <a:off x="5152680" y="4058640"/>
+            <a:ext cx="4426920" cy="2090880"/>
           </a:xfrm>
           <a:prstGeom prst="rect">
             <a:avLst/>
@@ -2829,7 +2829,7 @@
         <p:spPr>
           <a:xfrm>
             <a:off x="504000" y="301320"/>
-            <a:ext cx="9071280" cy="1261800"/>
+            <a:ext cx="9072000" cy="1261800"/>
           </a:xfrm>
           <a:prstGeom prst="rect">
             <a:avLst/>
@@ -2865,8 +2865,8 @@
         </p:nvSpPr>
         <p:spPr>
           <a:xfrm>
-            <a:off x="504000" y="1769040"/>
-            <a:ext cx="4426560" cy="2090880"/>
+            <a:off x="504000" y="1768680"/>
+            <a:ext cx="4426920" cy="2090880"/>
           </a:xfrm>
           <a:prstGeom prst="rect">
             <a:avLst/>
@@ -2901,8 +2901,8 @@
         </p:nvSpPr>
         <p:spPr>
           <a:xfrm>
-            <a:off x="5152320" y="1769040"/>
-            <a:ext cx="4426560" cy="2090880"/>
+            <a:off x="5152680" y="1768680"/>
+            <a:ext cx="4426920" cy="2090880"/>
           </a:xfrm>
           <a:prstGeom prst="rect">
             <a:avLst/>
@@ -2937,8 +2937,8 @@
         </p:nvSpPr>
         <p:spPr>
           <a:xfrm>
-            <a:off x="504000" y="4059000"/>
-            <a:ext cx="9071280" cy="2090880"/>
+            <a:off x="504000" y="4058640"/>
+            <a:ext cx="9072000" cy="2090880"/>
           </a:xfrm>
           <a:prstGeom prst="rect">
             <a:avLst/>
@@ -2996,7 +2996,7 @@
         <p:spPr>
           <a:xfrm>
             <a:off x="504000" y="301320"/>
-            <a:ext cx="9071280" cy="1261800"/>
+            <a:ext cx="9070920" cy="1261440"/>
           </a:xfrm>
           <a:prstGeom prst="rect">
             <a:avLst/>
@@ -3032,8 +3032,8 @@
         </p:nvSpPr>
         <p:spPr>
           <a:xfrm>
-            <a:off x="504000" y="1768680"/>
-            <a:ext cx="9072000" cy="4384080"/>
+            <a:off x="504000" y="1769040"/>
+            <a:ext cx="9070920" cy="4383720"/>
           </a:xfrm>
           <a:prstGeom prst="rect">
             <a:avLst/>
@@ -3051,7 +3051,7 @@
               <a:buChar char=""/>
             </a:pPr>
             <a:r>
-              <a:rPr lang="en-US" sz="3200" spc="-1" strike="noStrike">
+              <a:rPr lang="en-US" sz="1800" spc="-1" strike="noStrike">
                 <a:solidFill>
                   <a:srgbClr val="000000"/>
                 </a:solidFill>
@@ -3064,7 +3064,7 @@
               </a:rPr>
               <a:t>Click to edit the outline text format</a:t>
             </a:r>
-            <a:endParaRPr lang="en-US" sz="3200" spc="-1" strike="noStrike">
+            <a:endParaRPr lang="en-US" sz="1800" spc="-1" strike="noStrike">
               <a:solidFill>
                 <a:srgbClr val="000000"/>
               </a:solidFill>
@@ -3086,7 +3086,7 @@
               <a:buChar char=""/>
             </a:pPr>
             <a:r>
-              <a:rPr lang="en-US" sz="2800" spc="-1" strike="noStrike">
+              <a:rPr lang="en-US" sz="1800" spc="-1" strike="noStrike">
                 <a:solidFill>
                   <a:srgbClr val="000000"/>
                 </a:solidFill>
@@ -3099,7 +3099,7 @@
               </a:rPr>
               <a:t>Second Outline Level</a:t>
             </a:r>
-            <a:endParaRPr lang="en-US" sz="2800" spc="-1" strike="noStrike">
+            <a:endParaRPr lang="en-US" sz="1800" spc="-1" strike="noStrike">
               <a:solidFill>
                 <a:srgbClr val="000000"/>
               </a:solidFill>
@@ -3121,7 +3121,7 @@
               <a:buChar char=""/>
             </a:pPr>
             <a:r>
-              <a:rPr lang="en-US" sz="2400" spc="-1" strike="noStrike">
+              <a:rPr lang="en-US" sz="1800" spc="-1" strike="noStrike">
                 <a:solidFill>
                   <a:srgbClr val="000000"/>
                 </a:solidFill>
@@ -3134,7 +3134,7 @@
               </a:rPr>
               <a:t>Third Outline Level</a:t>
             </a:r>
-            <a:endParaRPr lang="en-US" sz="2400" spc="-1" strike="noStrike">
+            <a:endParaRPr lang="en-US" sz="1800" spc="-1" strike="noStrike">
               <a:solidFill>
                 <a:srgbClr val="000000"/>
               </a:solidFill>
@@ -3156,7 +3156,7 @@
               <a:buChar char=""/>
             </a:pPr>
             <a:r>
-              <a:rPr lang="en-US" sz="2000" spc="-1" strike="noStrike">
+              <a:rPr lang="en-US" sz="1800" spc="-1" strike="noStrike">
                 <a:solidFill>
                   <a:srgbClr val="000000"/>
                 </a:solidFill>
@@ -3169,7 +3169,7 @@
               </a:rPr>
               <a:t>Fourth Outline Level</a:t>
             </a:r>
-            <a:endParaRPr lang="en-US" sz="2000" spc="-1" strike="noStrike">
+            <a:endParaRPr lang="en-US" sz="1800" spc="-1" strike="noStrike">
               <a:solidFill>
                 <a:srgbClr val="000000"/>
               </a:solidFill>
@@ -3191,7 +3191,7 @@
               <a:buChar char=""/>
             </a:pPr>
             <a:r>
-              <a:rPr lang="en-US" sz="2000" spc="-1" strike="noStrike">
+              <a:rPr lang="en-US" sz="1800" spc="-1" strike="noStrike">
                 <a:solidFill>
                   <a:srgbClr val="000000"/>
                 </a:solidFill>
@@ -3204,7 +3204,7 @@
               </a:rPr>
               <a:t>Fifth Outline Level</a:t>
             </a:r>
-            <a:endParaRPr lang="en-US" sz="2000" spc="-1" strike="noStrike">
+            <a:endParaRPr lang="en-US" sz="1800" spc="-1" strike="noStrike">
               <a:solidFill>
                 <a:srgbClr val="000000"/>
               </a:solidFill>
@@ -3226,7 +3226,7 @@
               <a:buChar char=""/>
             </a:pPr>
             <a:r>
-              <a:rPr lang="en-US" sz="2000" spc="-1" strike="noStrike">
+              <a:rPr lang="en-US" sz="1800" spc="-1" strike="noStrike">
                 <a:solidFill>
                   <a:srgbClr val="000000"/>
                 </a:solidFill>
@@ -3239,7 +3239,7 @@
               </a:rPr>
               <a:t>Sixth Outline Level</a:t>
             </a:r>
-            <a:endParaRPr lang="en-US" sz="2000" spc="-1" strike="noStrike">
+            <a:endParaRPr lang="en-US" sz="1800" spc="-1" strike="noStrike">
               <a:solidFill>
                 <a:srgbClr val="000000"/>
               </a:solidFill>
@@ -3261,7 +3261,7 @@
               <a:buChar char=""/>
             </a:pPr>
             <a:r>
-              <a:rPr lang="en-US" sz="2000" spc="-1" strike="noStrike">
+              <a:rPr lang="en-US" sz="1800" spc="-1" strike="noStrike">
                 <a:solidFill>
                   <a:srgbClr val="000000"/>
                 </a:solidFill>
@@ -3274,7 +3274,7 @@
               </a:rPr>
               <a:t>Seventh Outline Level</a:t>
             </a:r>
-            <a:endParaRPr lang="en-US" sz="2000" spc="-1" strike="noStrike">
+            <a:endParaRPr lang="en-US" sz="1800" spc="-1" strike="noStrike">
               <a:solidFill>
                 <a:srgbClr val="000000"/>
               </a:solidFill>
@@ -3338,7 +3338,7 @@
         <p:spPr>
           <a:xfrm>
             <a:off x="504000" y="301320"/>
-            <a:ext cx="9071280" cy="1261800"/>
+            <a:ext cx="9072000" cy="1261800"/>
           </a:xfrm>
           <a:prstGeom prst="rect">
             <a:avLst/>
@@ -3348,6 +3348,20 @@
           <a:bodyPr lIns="0" rIns="0" tIns="0" bIns="0" anchor="ctr"/>
           <a:p>
             <a:pPr algn="ctr"/>
+            <a:r>
+              <a:rPr lang="en-US" sz="4400" spc="-1" strike="noStrike">
+                <a:solidFill>
+                  <a:srgbClr val="000000"/>
+                </a:solidFill>
+                <a:uFill>
+                  <a:solidFill>
+                    <a:srgbClr val="ffffff"/>
+                  </a:solidFill>
+                </a:uFill>
+                <a:latin typeface="Arial"/>
+              </a:rPr>
+              <a:t>Click to edit the title text format</a:t>
+            </a:r>
             <a:endParaRPr lang="en-US" sz="4400" spc="-1" strike="noStrike">
               <a:solidFill>
                 <a:srgbClr val="000000"/>
@@ -3374,8 +3388,8 @@
         </p:nvSpPr>
         <p:spPr>
           <a:xfrm>
-            <a:off x="504000" y="1769040"/>
-            <a:ext cx="9071280" cy="4384080"/>
+            <a:off x="504000" y="1768680"/>
+            <a:ext cx="9072000" cy="4384080"/>
           </a:xfrm>
           <a:prstGeom prst="rect">
             <a:avLst/>
@@ -3393,7 +3407,7 @@
               <a:buChar char=""/>
             </a:pPr>
             <a:r>
-              <a:rPr lang="en-US" sz="1800" spc="-1" strike="noStrike">
+              <a:rPr lang="en-US" sz="3200" spc="-1" strike="noStrike">
                 <a:solidFill>
                   <a:srgbClr val="000000"/>
                 </a:solidFill>
@@ -3406,7 +3420,7 @@
               </a:rPr>
               <a:t>Click to edit the outline text format</a:t>
             </a:r>
-            <a:endParaRPr lang="en-US" sz="1800" spc="-1" strike="noStrike">
+            <a:endParaRPr lang="en-US" sz="3200" spc="-1" strike="noStrike">
               <a:solidFill>
                 <a:srgbClr val="000000"/>
               </a:solidFill>
@@ -3428,7 +3442,7 @@
               <a:buChar char=""/>
             </a:pPr>
             <a:r>
-              <a:rPr lang="en-US" sz="1800" spc="-1" strike="noStrike">
+              <a:rPr lang="en-US" sz="2800" spc="-1" strike="noStrike">
                 <a:solidFill>
                   <a:srgbClr val="000000"/>
                 </a:solidFill>
@@ -3441,7 +3455,7 @@
               </a:rPr>
               <a:t>Second Outline Level</a:t>
             </a:r>
-            <a:endParaRPr lang="en-US" sz="1800" spc="-1" strike="noStrike">
+            <a:endParaRPr lang="en-US" sz="2800" spc="-1" strike="noStrike">
               <a:solidFill>
                 <a:srgbClr val="000000"/>
               </a:solidFill>
@@ -3463,7 +3477,7 @@
               <a:buChar char=""/>
             </a:pPr>
             <a:r>
-              <a:rPr lang="en-US" sz="1800" spc="-1" strike="noStrike">
+              <a:rPr lang="en-US" sz="2400" spc="-1" strike="noStrike">
                 <a:solidFill>
                   <a:srgbClr val="000000"/>
                 </a:solidFill>
@@ -3476,7 +3490,7 @@
               </a:rPr>
               <a:t>Third Outline Level</a:t>
             </a:r>
-            <a:endParaRPr lang="en-US" sz="1800" spc="-1" strike="noStrike">
+            <a:endParaRPr lang="en-US" sz="2400" spc="-1" strike="noStrike">
               <a:solidFill>
                 <a:srgbClr val="000000"/>
               </a:solidFill>
@@ -3498,7 +3512,7 @@
               <a:buChar char=""/>
             </a:pPr>
             <a:r>
-              <a:rPr lang="en-US" sz="1800" spc="-1" strike="noStrike">
+              <a:rPr lang="en-US" sz="2000" spc="-1" strike="noStrike">
                 <a:solidFill>
                   <a:srgbClr val="000000"/>
                 </a:solidFill>
@@ -3511,7 +3525,7 @@
               </a:rPr>
               <a:t>Fourth Outline Level</a:t>
             </a:r>
-            <a:endParaRPr lang="en-US" sz="1800" spc="-1" strike="noStrike">
+            <a:endParaRPr lang="en-US" sz="2000" spc="-1" strike="noStrike">
               <a:solidFill>
                 <a:srgbClr val="000000"/>
               </a:solidFill>
@@ -3533,7 +3547,7 @@
               <a:buChar char=""/>
             </a:pPr>
             <a:r>
-              <a:rPr lang="en-US" sz="1800" spc="-1" strike="noStrike">
+              <a:rPr lang="en-US" sz="2000" spc="-1" strike="noStrike">
                 <a:solidFill>
                   <a:srgbClr val="000000"/>
                 </a:solidFill>
@@ -3546,7 +3560,7 @@
               </a:rPr>
               <a:t>Fifth Outline Level</a:t>
             </a:r>
-            <a:endParaRPr lang="en-US" sz="1800" spc="-1" strike="noStrike">
+            <a:endParaRPr lang="en-US" sz="2000" spc="-1" strike="noStrike">
               <a:solidFill>
                 <a:srgbClr val="000000"/>
               </a:solidFill>
@@ -3568,7 +3582,7 @@
               <a:buChar char=""/>
             </a:pPr>
             <a:r>
-              <a:rPr lang="en-US" sz="1800" spc="-1" strike="noStrike">
+              <a:rPr lang="en-US" sz="2000" spc="-1" strike="noStrike">
                 <a:solidFill>
                   <a:srgbClr val="000000"/>
                 </a:solidFill>
@@ -3581,7 +3595,7 @@
               </a:rPr>
               <a:t>Sixth Outline Level</a:t>
             </a:r>
-            <a:endParaRPr lang="en-US" sz="1800" spc="-1" strike="noStrike">
+            <a:endParaRPr lang="en-US" sz="2000" spc="-1" strike="noStrike">
               <a:solidFill>
                 <a:srgbClr val="000000"/>
               </a:solidFill>
@@ -3603,7 +3617,7 @@
               <a:buChar char=""/>
             </a:pPr>
             <a:r>
-              <a:rPr lang="en-US" sz="1800" spc="-1" strike="noStrike">
+              <a:rPr lang="en-US" sz="2000" spc="-1" strike="noStrike">
                 <a:solidFill>
                   <a:srgbClr val="000000"/>
                 </a:solidFill>
@@ -3616,7 +3630,7 @@
               </a:rPr>
               <a:t>Seventh Outline Level</a:t>
             </a:r>
-            <a:endParaRPr lang="en-US" sz="1800" spc="-1" strike="noStrike">
+            <a:endParaRPr lang="en-US" sz="2000" spc="-1" strike="noStrike">
               <a:solidFill>
                 <a:srgbClr val="000000"/>
               </a:solidFill>
@@ -3676,7 +3690,7 @@
         <p:spPr>
           <a:xfrm>
             <a:off x="548640" y="457200"/>
-            <a:ext cx="9143640" cy="3382920"/>
+            <a:ext cx="9143280" cy="3382560"/>
           </a:xfrm>
           <a:prstGeom prst="rect">
             <a:avLst/>
@@ -3901,7 +3915,7 @@
         <p:spPr>
           <a:xfrm>
             <a:off x="3017520" y="6400800"/>
-            <a:ext cx="3748680" cy="639720"/>
+            <a:ext cx="3748320" cy="639360"/>
           </a:xfrm>
           <a:custGeom>
             <a:avLst/>
@@ -4009,7 +4023,7 @@
         <p:spPr>
           <a:xfrm>
             <a:off x="3665520" y="4206240"/>
-            <a:ext cx="182520" cy="182520"/>
+            <a:ext cx="182160" cy="182160"/>
           </a:xfrm>
           <a:prstGeom prst="rect">
             <a:avLst/>
@@ -4039,7 +4053,7 @@
         <p:spPr>
           <a:xfrm>
             <a:off x="3939840" y="4134240"/>
-            <a:ext cx="674280" cy="345960"/>
+            <a:ext cx="673920" cy="345600"/>
           </a:xfrm>
           <a:prstGeom prst="rect">
             <a:avLst/>
@@ -4069,6 +4083,7 @@
                   </a:solidFill>
                 </a:uFill>
                 <a:latin typeface="Arial"/>
+                <a:ea typeface="DejaVu Sans"/>
               </a:rPr>
               <a:t>Male</a:t>
             </a:r>
@@ -4095,7 +4110,7 @@
         <p:spPr>
           <a:xfrm>
             <a:off x="4819680" y="4206240"/>
-            <a:ext cx="182520" cy="182520"/>
+            <a:ext cx="182160" cy="182160"/>
           </a:xfrm>
           <a:prstGeom prst="rect">
             <a:avLst/>
@@ -4125,7 +4140,7 @@
         <p:spPr>
           <a:xfrm>
             <a:off x="5002560" y="4134240"/>
-            <a:ext cx="940680" cy="345960"/>
+            <a:ext cx="940320" cy="345600"/>
           </a:xfrm>
           <a:prstGeom prst="rect">
             <a:avLst/>
@@ -4155,6 +4170,7 @@
                   </a:solidFill>
                 </a:uFill>
                 <a:latin typeface="Arial"/>
+                <a:ea typeface="DejaVu Sans"/>
               </a:rPr>
               <a:t>Female</a:t>
             </a:r>
@@ -4181,7 +4197,7 @@
         <p:spPr>
           <a:xfrm>
             <a:off x="2560320" y="4663440"/>
-            <a:ext cx="4754520" cy="365400"/>
+            <a:ext cx="4754160" cy="365040"/>
           </a:xfrm>
           <a:prstGeom prst="rect">
             <a:avLst/>
@@ -4247,7 +4263,7 @@
         <p:spPr>
           <a:xfrm>
             <a:off x="3749040" y="5303520"/>
-            <a:ext cx="2102760" cy="273960"/>
+            <a:ext cx="2102400" cy="273600"/>
           </a:xfrm>
           <a:prstGeom prst="rect">
             <a:avLst/>
@@ -4313,7 +4329,7 @@
         <p:spPr>
           <a:xfrm>
             <a:off x="4389120" y="19440"/>
-            <a:ext cx="822600" cy="345960"/>
+            <a:ext cx="822240" cy="345600"/>
           </a:xfrm>
           <a:prstGeom prst="rect">
             <a:avLst/>
@@ -4343,6 +4359,7 @@
                   </a:solidFill>
                 </a:uFill>
                 <a:latin typeface="Arial"/>
+                <a:ea typeface="DejaVu Sans"/>
               </a:rPr>
               <a:t>Home</a:t>
             </a:r>
@@ -4369,7 +4386,7 @@
         <p:spPr>
           <a:xfrm>
             <a:off x="4023360" y="7132320"/>
-            <a:ext cx="1554120" cy="273960"/>
+            <a:ext cx="1553760" cy="273600"/>
           </a:xfrm>
           <a:prstGeom prst="rect">
             <a:avLst/>
@@ -4484,7 +4501,7 @@
         <p:spPr>
           <a:xfrm>
             <a:off x="2817360" y="531360"/>
-            <a:ext cx="3840120" cy="3474360"/>
+            <a:ext cx="3839760" cy="3474000"/>
           </a:xfrm>
           <a:prstGeom prst="ellipse">
             <a:avLst/>
@@ -4550,7 +4567,7 @@
         <p:spPr>
           <a:xfrm>
             <a:off x="4572000" y="6217920"/>
-            <a:ext cx="639720" cy="548280"/>
+            <a:ext cx="639360" cy="547920"/>
           </a:xfrm>
           <a:prstGeom prst="rect">
             <a:avLst/>
@@ -4616,7 +4633,7 @@
         <p:spPr>
           <a:xfrm>
             <a:off x="5394960" y="6217920"/>
-            <a:ext cx="639720" cy="548280"/>
+            <a:ext cx="639360" cy="547920"/>
           </a:xfrm>
           <a:prstGeom prst="rect">
             <a:avLst/>
@@ -4682,7 +4699,7 @@
         <p:spPr>
           <a:xfrm>
             <a:off x="6217920" y="6217920"/>
-            <a:ext cx="639720" cy="548280"/>
+            <a:ext cx="639360" cy="547920"/>
           </a:xfrm>
           <a:prstGeom prst="rect">
             <a:avLst/>
@@ -4748,7 +4765,7 @@
         <p:spPr>
           <a:xfrm>
             <a:off x="2377440" y="5577840"/>
-            <a:ext cx="2011320" cy="548280"/>
+            <a:ext cx="2010960" cy="547920"/>
           </a:xfrm>
           <a:prstGeom prst="rect">
             <a:avLst/>
@@ -4814,7 +4831,7 @@
         <p:spPr>
           <a:xfrm>
             <a:off x="2743200" y="4389120"/>
-            <a:ext cx="3748680" cy="639720"/>
+            <a:ext cx="3748320" cy="639360"/>
           </a:xfrm>
           <a:custGeom>
             <a:avLst/>
@@ -4971,7 +4988,7 @@
         <p:spPr>
           <a:xfrm>
             <a:off x="4206240" y="91440"/>
-            <a:ext cx="1371240" cy="345960"/>
+            <a:ext cx="1370880" cy="345600"/>
           </a:xfrm>
           <a:prstGeom prst="rect">
             <a:avLst/>
@@ -5001,6 +5018,7 @@
                   </a:solidFill>
                 </a:uFill>
                 <a:latin typeface="Arial"/>
+                <a:ea typeface="DejaVu Sans"/>
               </a:rPr>
               <a:t>Create Poll</a:t>
             </a:r>
@@ -5027,7 +5045,7 @@
         <p:spPr>
           <a:xfrm>
             <a:off x="457200" y="457200"/>
-            <a:ext cx="9143640" cy="3382920"/>
+            <a:ext cx="9143280" cy="3382560"/>
           </a:xfrm>
           <a:prstGeom prst="rect">
             <a:avLst/>
@@ -5252,7 +5270,7 @@
         <p:spPr>
           <a:xfrm>
             <a:off x="457200" y="4023360"/>
-            <a:ext cx="9143640" cy="2651400"/>
+            <a:ext cx="9143280" cy="2651040"/>
           </a:xfrm>
           <a:prstGeom prst="rect">
             <a:avLst/>
@@ -5351,7 +5369,7 @@
         <p:spPr>
           <a:xfrm>
             <a:off x="3200400" y="6766560"/>
-            <a:ext cx="3748680" cy="639720"/>
+            <a:ext cx="3748320" cy="639360"/>
           </a:xfrm>
           <a:custGeom>
             <a:avLst/>
@@ -5508,7 +5526,7 @@
         <p:spPr>
           <a:xfrm>
             <a:off x="457200" y="2194560"/>
-            <a:ext cx="9143640" cy="2651400"/>
+            <a:ext cx="9143280" cy="2651040"/>
           </a:xfrm>
           <a:prstGeom prst="rect">
             <a:avLst/>
@@ -5641,7 +5659,7 @@
         <p:spPr>
           <a:xfrm>
             <a:off x="227520" y="3066840"/>
-            <a:ext cx="9071280" cy="1261800"/>
+            <a:ext cx="9070920" cy="1261440"/>
           </a:xfrm>
           <a:prstGeom prst="rect">
             <a:avLst/>
@@ -5676,6 +5694,7 @@
                   </a:solidFill>
                 </a:uFill>
                 <a:latin typeface="Arial"/>
+                <a:ea typeface="DejaVu Sans"/>
               </a:rPr>
               <a:t>Backend Diagrams</a:t>
             </a:r>
@@ -5751,7 +5770,7 @@
         <p:spPr>
           <a:xfrm>
             <a:off x="504000" y="294480"/>
-            <a:ext cx="9071280" cy="626400"/>
+            <a:ext cx="9070920" cy="626040"/>
           </a:xfrm>
           <a:prstGeom prst="rect">
             <a:avLst/>
@@ -5786,6 +5805,7 @@
                   </a:solidFill>
                 </a:uFill>
                 <a:latin typeface="Arial"/>
+                <a:ea typeface="DejaVu Sans"/>
               </a:rPr>
               <a:t>ERD</a:t>
             </a:r>
@@ -5811,8 +5831,8 @@
         </p:nvSpPr>
         <p:spPr>
           <a:xfrm>
-            <a:off x="4070160" y="4186440"/>
-            <a:ext cx="1645920" cy="1371600"/>
+            <a:off x="4034160" y="4186440"/>
+            <a:ext cx="1645560" cy="1371240"/>
           </a:xfrm>
           <a:prstGeom prst="rect">
             <a:avLst/>
@@ -5878,7 +5898,7 @@
         <p:spPr>
           <a:xfrm>
             <a:off x="3978360" y="1645920"/>
-            <a:ext cx="1737720" cy="1280160"/>
+            <a:ext cx="1737360" cy="1279800"/>
           </a:xfrm>
           <a:prstGeom prst="rect">
             <a:avLst/>
@@ -5944,7 +5964,7 @@
         <p:spPr>
           <a:xfrm>
             <a:off x="7040880" y="1645920"/>
-            <a:ext cx="1554480" cy="1280160"/>
+            <a:ext cx="1554120" cy="1279800"/>
           </a:xfrm>
           <a:prstGeom prst="rect">
             <a:avLst/>
@@ -6010,7 +6030,7 @@
         <p:spPr>
           <a:xfrm>
             <a:off x="4618800" y="3840480"/>
-            <a:ext cx="273960" cy="345960"/>
+            <a:ext cx="273600" cy="345600"/>
           </a:xfrm>
           <a:prstGeom prst="rect">
             <a:avLst/>
@@ -6040,6 +6060,7 @@
                   </a:solidFill>
                 </a:uFill>
                 <a:latin typeface="Arial"/>
+                <a:ea typeface="DejaVu Sans"/>
               </a:rPr>
               <a:t>1</a:t>
             </a:r>
@@ -6066,7 +6087,7 @@
         <p:spPr>
           <a:xfrm>
             <a:off x="4618800" y="2945880"/>
-            <a:ext cx="273960" cy="345960"/>
+            <a:ext cx="273600" cy="345600"/>
           </a:xfrm>
           <a:prstGeom prst="rect">
             <a:avLst/>
@@ -6096,6 +6117,7 @@
                   </a:solidFill>
                 </a:uFill>
                 <a:latin typeface="Arial"/>
+                <a:ea typeface="DejaVu Sans"/>
               </a:rPr>
               <a:t>*</a:t>
             </a:r>
@@ -6122,7 +6144,7 @@
         <p:spPr>
           <a:xfrm>
             <a:off x="5716080" y="1985760"/>
-            <a:ext cx="273960" cy="345960"/>
+            <a:ext cx="273600" cy="345600"/>
           </a:xfrm>
           <a:prstGeom prst="rect">
             <a:avLst/>
@@ -6152,6 +6174,7 @@
                   </a:solidFill>
                 </a:uFill>
                 <a:latin typeface="Arial"/>
+                <a:ea typeface="DejaVu Sans"/>
               </a:rPr>
               <a:t>1</a:t>
             </a:r>
@@ -6178,7 +6201,7 @@
         <p:spPr>
           <a:xfrm>
             <a:off x="6813000" y="1986120"/>
-            <a:ext cx="273960" cy="345600"/>
+            <a:ext cx="273600" cy="345240"/>
           </a:xfrm>
           <a:prstGeom prst="rect">
             <a:avLst/>
@@ -6208,6 +6231,7 @@
                   </a:solidFill>
                 </a:uFill>
                 <a:latin typeface="Arial"/>
+                <a:ea typeface="DejaVu Sans"/>
               </a:rPr>
               <a:t>*</a:t>
             </a:r>
@@ -6234,7 +6258,7 @@
         <p:spPr>
           <a:xfrm>
             <a:off x="1160640" y="1645920"/>
-            <a:ext cx="1645920" cy="1280160"/>
+            <a:ext cx="1645560" cy="1279800"/>
           </a:xfrm>
           <a:prstGeom prst="rect">
             <a:avLst/>
@@ -6291,12 +6315,12 @@
           </a:p>
         </p:txBody>
       </p:sp>
-      <p:cxnSp>
-        <p:nvCxnSpPr>
+      <p:sp>
+        <p:nvSpPr>
           <p:cNvPr id="103" name="Line 10"/>
-          <p:cNvCxnSpPr/>
+          <p:cNvSpPr/>
           <p:nvPr/>
-        </p:nvCxnSpPr>
+        </p:nvSpPr>
         <p:spPr>
           <a:xfrm>
             <a:off x="0" y="0"/>
@@ -6312,32 +6336,38 @@
             <a:tailEnd len="med" type="triangle" w="med"/>
           </a:ln>
         </p:spPr>
-      </p:cxnSp>
-      <p:sp>
-        <p:nvSpPr>
-          <p:cNvPr id="104" name="CustomShape 11"/>
-          <p:cNvSpPr/>
-          <p:nvPr/>
-        </p:nvSpPr>
-        <p:spPr>
-          <a:xfrm>
-            <a:off x="3704400" y="1940040"/>
-            <a:ext cx="273960" cy="345960"/>
-          </a:xfrm>
-          <a:prstGeom prst="rect">
-            <a:avLst/>
-          </a:prstGeom>
-          <a:noFill/>
-          <a:ln>
-            <a:noFill/>
-          </a:ln>
-        </p:spPr>
         <p:style>
           <a:lnRef idx="0"/>
           <a:fillRef idx="0"/>
           <a:effectRef idx="0"/>
           <a:fontRef idx="minor"/>
         </p:style>
+      </p:sp>
+      <p:sp>
+        <p:nvSpPr>
+          <p:cNvPr id="104" name="CustomShape 11"/>
+          <p:cNvSpPr/>
+          <p:nvPr/>
+        </p:nvSpPr>
+        <p:spPr>
+          <a:xfrm>
+            <a:off x="3704400" y="1940040"/>
+            <a:ext cx="273600" cy="345600"/>
+          </a:xfrm>
+          <a:prstGeom prst="rect">
+            <a:avLst/>
+          </a:prstGeom>
+          <a:noFill/>
+          <a:ln>
+            <a:noFill/>
+          </a:ln>
+        </p:spPr>
+        <p:style>
+          <a:lnRef idx="0"/>
+          <a:fillRef idx="0"/>
+          <a:effectRef idx="0"/>
+          <a:fontRef idx="minor"/>
+        </p:style>
         <p:txBody>
           <a:bodyPr lIns="90000" rIns="90000" tIns="45000" bIns="45000"/>
           <a:p>
@@ -6352,6 +6382,7 @@
                   </a:solidFill>
                 </a:uFill>
                 <a:latin typeface="Arial"/>
+                <a:ea typeface="DejaVu Sans"/>
               </a:rPr>
               <a:t>1</a:t>
             </a:r>
@@ -6378,7 +6409,7 @@
         <p:spPr>
           <a:xfrm>
             <a:off x="2881440" y="2011680"/>
-            <a:ext cx="273960" cy="345960"/>
+            <a:ext cx="273600" cy="345600"/>
           </a:xfrm>
           <a:prstGeom prst="rect">
             <a:avLst/>
@@ -6408,6 +6439,7 @@
                   </a:solidFill>
                 </a:uFill>
                 <a:latin typeface="Arial"/>
+                <a:ea typeface="DejaVu Sans"/>
               </a:rPr>
               <a:t>*</a:t>
             </a:r>
@@ -6425,12 +6457,12 @@
           </a:p>
         </p:txBody>
       </p:sp>
-      <p:cxnSp>
-        <p:nvCxnSpPr>
+      <p:sp>
+        <p:nvSpPr>
           <p:cNvPr id="106" name="Line 13"/>
-          <p:cNvCxnSpPr/>
+          <p:cNvSpPr/>
           <p:nvPr/>
-        </p:nvCxnSpPr>
+        </p:nvSpPr>
         <p:spPr>
           <a:xfrm>
             <a:off x="0" y="0"/>
@@ -6446,10 +6478,88 @@
             <a:tailEnd len="med" type="triangle" w="med"/>
           </a:ln>
         </p:spPr>
+        <p:style>
+          <a:lnRef idx="0"/>
+          <a:fillRef idx="0"/>
+          <a:effectRef idx="0"/>
+          <a:fontRef idx="minor"/>
+        </p:style>
+      </p:sp>
+      <p:sp>
+        <p:nvSpPr>
+          <p:cNvPr id="107" name="Line 14"/>
+          <p:cNvSpPr/>
+          <p:nvPr/>
+        </p:nvSpPr>
+        <p:spPr>
+          <a:xfrm>
+            <a:off x="0" y="0"/>
+            <a:ext cx="360" cy="360"/>
+          </a:xfrm>
+          <a:prstGeom prst="line">
+            <a:avLst/>
+          </a:prstGeom>
+          <a:ln>
+            <a:solidFill>
+              <a:srgbClr val="000000"/>
+            </a:solidFill>
+            <a:tailEnd len="med" type="triangle" w="med"/>
+          </a:ln>
+        </p:spPr>
+        <p:style>
+          <a:lnRef idx="0"/>
+          <a:fillRef idx="0"/>
+          <a:effectRef idx="0"/>
+          <a:fontRef idx="minor"/>
+        </p:style>
+      </p:sp>
+      <p:cxnSp>
+        <p:nvCxnSpPr>
+          <p:cNvPr id="108" name="Line 15"/>
+          <p:cNvCxnSpPr/>
+          <p:nvPr/>
+        </p:nvCxnSpPr>
+        <p:spPr>
+          <a:xfrm>
+            <a:off x="0" y="0"/>
+            <a:ext cx="360" cy="360"/>
+          </a:xfrm>
+          <a:prstGeom prst="line">
+            <a:avLst/>
+          </a:prstGeom>
+          <a:ln>
+            <a:solidFill>
+              <a:srgbClr val="000000"/>
+            </a:solidFill>
+            <a:tailEnd len="med" type="triangle" w="med"/>
+          </a:ln>
+        </p:spPr>
       </p:cxnSp>
       <p:cxnSp>
         <p:nvCxnSpPr>
-          <p:cNvPr id="107" name="Line 14"/>
+          <p:cNvPr id="109" name="Line 16"/>
+          <p:cNvCxnSpPr/>
+          <p:nvPr/>
+        </p:nvCxnSpPr>
+        <p:spPr>
+          <a:xfrm>
+            <a:off x="0" y="0"/>
+            <a:ext cx="360" cy="360"/>
+          </a:xfrm>
+          <a:prstGeom prst="line">
+            <a:avLst/>
+          </a:prstGeom>
+          <a:ln>
+            <a:solidFill>
+              <a:srgbClr val="000000"/>
+            </a:solidFill>
+            <a:tailEnd len="med" type="triangle" w="med"/>
+          </a:ln>
+        </p:spPr>
+      </p:cxnSp>
+      <p:cxnSp>
+        <p:nvCxnSpPr>
+          <p:cNvPr id="110" name="Line 17"/>
           <p:cNvCxnSpPr/>
           <p:nvPr/>
         </p:nvCxnSpPr>

</xml_diff>